<commit_message>
Updated the download link for neo4j
</commit_message>
<xml_diff>
--- a/2018-2019/build/Lecture 5.pptx
+++ b/2018-2019/build/Lecture 5.pptx
@@ -2173,7 +2173,7 @@
           </a:ln>
           <a:extLst>
             <a:ext uri="{C572A759-6A51-4108-AA02-DFA0A04FC94B}">
-              <ma14:wrappingTextBoxFlag xmlns:ma14="http://schemas.microsoft.com/office/mac/drawingml/2011/main" xmlns="" val="1"/>
+              <ma14:wrappingTextBoxFlag xmlns="" xmlns:ma14="http://schemas.microsoft.com/office/mac/drawingml/2011/main" val="1"/>
             </a:ext>
           </a:extLst>
         </p:spPr>
@@ -2212,7 +2212,7 @@
           </a:ln>
           <a:extLst>
             <a:ext uri="{C572A759-6A51-4108-AA02-DFA0A04FC94B}">
-              <ma14:wrappingTextBoxFlag xmlns:ma14="http://schemas.microsoft.com/office/mac/drawingml/2011/main" xmlns="" val="1"/>
+              <ma14:wrappingTextBoxFlag xmlns="" xmlns:ma14="http://schemas.microsoft.com/office/mac/drawingml/2011/main" val="1"/>
             </a:ext>
           </a:extLst>
         </p:spPr>
@@ -3609,7 +3609,7 @@
           </a:ln>
           <a:extLst>
             <a:ext uri="{C572A759-6A51-4108-AA02-DFA0A04FC94B}">
-              <ma14:wrappingTextBoxFlag xmlns:ma14="http://schemas.microsoft.com/office/mac/drawingml/2011/main" xmlns="" val="1"/>
+              <ma14:wrappingTextBoxFlag xmlns="" xmlns:ma14="http://schemas.microsoft.com/office/mac/drawingml/2011/main" val="1"/>
             </a:ext>
           </a:extLst>
         </p:spPr>
@@ -8199,7 +8199,7 @@
           </a:ln>
           <a:extLst>
             <a:ext uri="{C572A759-6A51-4108-AA02-DFA0A04FC94B}">
-              <ma14:wrappingTextBoxFlag xmlns:ma14="http://schemas.microsoft.com/office/mac/drawingml/2011/main" xmlns="" val="1"/>
+              <ma14:wrappingTextBoxFlag xmlns="" xmlns:ma14="http://schemas.microsoft.com/office/mac/drawingml/2011/main" val="1"/>
             </a:ext>
           </a:extLst>
         </p:spPr>
@@ -10088,7 +10088,7 @@
           </a:ln>
           <a:extLst>
             <a:ext uri="{C572A759-6A51-4108-AA02-DFA0A04FC94B}">
-              <ma14:wrappingTextBoxFlag xmlns:ma14="http://schemas.microsoft.com/office/mac/drawingml/2011/main" xmlns="" val="1"/>
+              <ma14:wrappingTextBoxFlag xmlns="" xmlns:ma14="http://schemas.microsoft.com/office/mac/drawingml/2011/main" val="1"/>
             </a:ext>
           </a:extLst>
         </p:spPr>
@@ -10135,7 +10135,7 @@
           </a:ln>
           <a:extLst>
             <a:ext uri="{C572A759-6A51-4108-AA02-DFA0A04FC94B}">
-              <ma14:wrappingTextBoxFlag xmlns:ma14="http://schemas.microsoft.com/office/mac/drawingml/2011/main" xmlns="" val="1"/>
+              <ma14:wrappingTextBoxFlag xmlns="" xmlns:ma14="http://schemas.microsoft.com/office/mac/drawingml/2011/main" val="1"/>
             </a:ext>
           </a:extLst>
         </p:spPr>
@@ -10428,7 +10428,7 @@
           </a:ln>
           <a:extLst>
             <a:ext uri="{C572A759-6A51-4108-AA02-DFA0A04FC94B}">
-              <ma14:wrappingTextBoxFlag xmlns:ma14="http://schemas.microsoft.com/office/mac/drawingml/2011/main" xmlns="" val="1"/>
+              <ma14:wrappingTextBoxFlag xmlns="" xmlns:ma14="http://schemas.microsoft.com/office/mac/drawingml/2011/main" val="1"/>
             </a:ext>
           </a:extLst>
         </p:spPr>
@@ -10475,7 +10475,7 @@
           </a:ln>
           <a:extLst>
             <a:ext uri="{C572A759-6A51-4108-AA02-DFA0A04FC94B}">
-              <ma14:wrappingTextBoxFlag xmlns:ma14="http://schemas.microsoft.com/office/mac/drawingml/2011/main" xmlns="" val="1"/>
+              <ma14:wrappingTextBoxFlag xmlns="" xmlns:ma14="http://schemas.microsoft.com/office/mac/drawingml/2011/main" val="1"/>
             </a:ext>
           </a:extLst>
         </p:spPr>
@@ -10519,7 +10519,7 @@
           </a:ln>
           <a:extLst>
             <a:ext uri="{C572A759-6A51-4108-AA02-DFA0A04FC94B}">
-              <ma14:wrappingTextBoxFlag xmlns:ma14="http://schemas.microsoft.com/office/mac/drawingml/2011/main" xmlns="" val="1"/>
+              <ma14:wrappingTextBoxFlag xmlns="" xmlns:ma14="http://schemas.microsoft.com/office/mac/drawingml/2011/main" val="1"/>
             </a:ext>
           </a:extLst>
         </p:spPr>
@@ -11840,10 +11840,11 @@
               </a:defRPr>
             </a:pPr>
             <a:r>
+              <a:rPr dirty="0"/>
               <a:t>Two</a:t>
             </a:r>
             <a:r>
-              <a:rPr>
+              <a:rPr dirty="0">
                 <a:solidFill>
                   <a:srgbClr val="000000"/>
                 </a:solidFill>
@@ -11851,10 +11852,11 @@
               <a:t> ways to </a:t>
             </a:r>
             <a:r>
+              <a:rPr dirty="0"/>
               <a:t>use</a:t>
             </a:r>
             <a:r>
-              <a:rPr>
+              <a:rPr dirty="0">
                 <a:solidFill>
                   <a:srgbClr val="000000"/>
                 </a:solidFill>
@@ -11880,17 +11882,18 @@
               </a:defRPr>
             </a:pPr>
             <a:r>
+              <a:rPr dirty="0"/>
               <a:t>Self-standing</a:t>
             </a:r>
             <a:r>
-              <a:rPr>
+              <a:rPr dirty="0">
                 <a:solidFill>
                   <a:srgbClr val="000000"/>
                 </a:solidFill>
               </a:rPr>
               <a:t> server + connections</a:t>
             </a:r>
-            <a:endParaRPr sz="2800"/>
+            <a:endParaRPr sz="2800" dirty="0"/>
           </a:p>
           <a:p>
             <a:pPr marL="914400" lvl="1" indent="-381000">
@@ -11910,10 +11913,11 @@
               </a:defRPr>
             </a:pPr>
             <a:r>
+              <a:rPr dirty="0" err="1"/>
               <a:t>Embeded</a:t>
             </a:r>
             <a:r>
-              <a:rPr>
+              <a:rPr dirty="0">
                 <a:solidFill>
                   <a:srgbClr val="000000"/>
                 </a:solidFill>
@@ -11921,13 +11925,13 @@
               <a:t>: Used directly within a Java application</a:t>
             </a:r>
             <a:br>
-              <a:rPr>
+              <a:rPr dirty="0">
                 <a:solidFill>
                   <a:srgbClr val="000000"/>
                 </a:solidFill>
               </a:rPr>
             </a:br>
-            <a:endParaRPr>
+            <a:endParaRPr dirty="0">
               <a:solidFill>
                 <a:srgbClr val="000000"/>
               </a:solidFill>
@@ -11943,6 +11947,7 @@
               <a:defRPr sz="1800"/>
             </a:pPr>
             <a:r>
+              <a:rPr dirty="0"/>
               <a:t>Server mode:</a:t>
             </a:r>
           </a:p>
@@ -11964,10 +11969,11 @@
               </a:defRPr>
             </a:pPr>
             <a:r>
+              <a:rPr dirty="0"/>
               <a:t>download</a:t>
             </a:r>
             <a:r>
-              <a:rPr>
+              <a:rPr dirty="0">
                 <a:solidFill>
                   <a:srgbClr val="000000"/>
                 </a:solidFill>
@@ -11975,7 +11981,7 @@
               <a:t> from </a:t>
             </a:r>
             <a:r>
-              <a:rPr u="sng">
+              <a:rPr lang="en-US" u="sng" dirty="0">
                 <a:solidFill>
                   <a:srgbClr val="0000FF"/>
                 </a:solidFill>
@@ -11986,9 +11992,18 @@
                 </a:uFill>
                 <a:hlinkClick r:id="rId2"/>
               </a:rPr>
-              <a:t>http://neo4j.com/download/</a:t>
-            </a:r>
-            <a:endParaRPr sz="2800"/>
+              <a:t>https://neo4j.com/download-center/</a:t>
+            </a:r>
+            <a:endParaRPr lang="en-US" u="sng" dirty="0">
+              <a:solidFill>
+                <a:srgbClr val="0000FF"/>
+              </a:solidFill>
+              <a:uFill>
+                <a:solidFill>
+                  <a:srgbClr val="0000FF"/>
+                </a:solidFill>
+              </a:uFill>
+            </a:endParaRPr>
           </a:p>
           <a:p>
             <a:pPr marL="914400" lvl="1" indent="-381000">
@@ -12001,13 +12016,18 @@
               <a:buSzPct val="80000"/>
               <a:buFont typeface="Courier New"/>
               <a:buChar char="o"/>
-              <a:defRPr sz="1800"/>
-            </a:pPr>
-            <a:r>
+              <a:defRPr sz="1800">
+                <a:solidFill>
+                  <a:srgbClr val="990000"/>
+                </a:solidFill>
+              </a:defRPr>
+            </a:pPr>
+            <a:r>
+              <a:rPr dirty="0"/>
               <a:t>extract </a:t>
             </a:r>
             <a:r>
-              <a:rPr>
+              <a:rPr dirty="0">
                 <a:latin typeface="Courier New"/>
                 <a:ea typeface="Courier New"/>
                 <a:cs typeface="Courier New"/>
@@ -12015,7 +12035,7 @@
               </a:rPr>
               <a:t>neo4j-community-X.Y.Z.tar.gz</a:t>
             </a:r>
-            <a:endParaRPr sz="2800"/>
+            <a:endParaRPr sz="2800" dirty="0"/>
           </a:p>
           <a:p>
             <a:pPr marL="914400" lvl="1" indent="-381000">
@@ -12036,9 +12056,18 @@
               </a:defRPr>
             </a:pPr>
             <a:r>
-              <a:t>./bin/neo4j start</a:t>
-            </a:r>
-            <a:endParaRPr sz="2800"/>
+              <a:rPr lang="en-US" sz="1800" dirty="0"/>
+              <a:t>s</a:t>
+            </a:r>
+            <a:r>
+              <a:rPr sz="1800" dirty="0"/>
+              <a:t>tart</a:t>
+            </a:r>
+            <a:r>
+              <a:rPr lang="en-US" sz="1800" dirty="0"/>
+              <a:t> neo4j and create a new graph database</a:t>
+            </a:r>
+            <a:endParaRPr sz="1800" dirty="0"/>
           </a:p>
           <a:p>
             <a:pPr marL="914400" lvl="1" indent="-381000">
@@ -12054,10 +12083,11 @@
               <a:defRPr sz="1800"/>
             </a:pPr>
             <a:r>
+              <a:rPr dirty="0"/>
               <a:t>go to: </a:t>
             </a:r>
             <a:r>
-              <a:rPr u="sng">
+              <a:rPr u="sng" dirty="0">
                 <a:solidFill>
                   <a:srgbClr val="0000FF"/>
                 </a:solidFill>
@@ -12553,7 +12583,7 @@
           </a:ln>
           <a:extLst>
             <a:ext uri="{C572A759-6A51-4108-AA02-DFA0A04FC94B}">
-              <ma14:wrappingTextBoxFlag xmlns:ma14="http://schemas.microsoft.com/office/mac/drawingml/2011/main" xmlns="" val="1"/>
+              <ma14:wrappingTextBoxFlag xmlns="" xmlns:ma14="http://schemas.microsoft.com/office/mac/drawingml/2011/main" val="1"/>
             </a:ext>
           </a:extLst>
         </p:spPr>
@@ -13157,7 +13187,7 @@
           </a:ln>
           <a:extLst>
             <a:ext uri="{C572A759-6A51-4108-AA02-DFA0A04FC94B}">
-              <ma14:wrappingTextBoxFlag xmlns:ma14="http://schemas.microsoft.com/office/mac/drawingml/2011/main" xmlns="" val="1"/>
+              <ma14:wrappingTextBoxFlag xmlns="" xmlns:ma14="http://schemas.microsoft.com/office/mac/drawingml/2011/main" val="1"/>
             </a:ext>
           </a:extLst>
         </p:spPr>
@@ -13543,7 +13573,7 @@
           </a:ln>
           <a:extLst>
             <a:ext uri="{C572A759-6A51-4108-AA02-DFA0A04FC94B}">
-              <ma14:wrappingTextBoxFlag xmlns:ma14="http://schemas.microsoft.com/office/mac/drawingml/2011/main" xmlns="" val="1"/>
+              <ma14:wrappingTextBoxFlag xmlns="" xmlns:ma14="http://schemas.microsoft.com/office/mac/drawingml/2011/main" val="1"/>
             </a:ext>
           </a:extLst>
         </p:spPr>
@@ -13966,7 +13996,7 @@
           </a:ln>
           <a:extLst>
             <a:ext uri="{C572A759-6A51-4108-AA02-DFA0A04FC94B}">
-              <ma14:wrappingTextBoxFlag xmlns:ma14="http://schemas.microsoft.com/office/mac/drawingml/2011/main" xmlns="" val="1"/>
+              <ma14:wrappingTextBoxFlag xmlns="" xmlns:ma14="http://schemas.microsoft.com/office/mac/drawingml/2011/main" val="1"/>
             </a:ext>
           </a:extLst>
         </p:spPr>
@@ -14619,7 +14649,7 @@
             <a:effectLst/>
             <a:extLst>
               <a:ext uri="{C572A759-6A51-4108-AA02-DFA0A04FC94B}">
-                <ma14:wrappingTextBoxFlag xmlns:ma14="http://schemas.microsoft.com/office/mac/drawingml/2011/main" xmlns="" val="1"/>
+                <ma14:wrappingTextBoxFlag xmlns="" xmlns:ma14="http://schemas.microsoft.com/office/mac/drawingml/2011/main" val="1"/>
               </a:ext>
             </a:extLst>
           </p:spPr>
@@ -14718,7 +14748,7 @@
             <a:effectLst/>
             <a:extLst>
               <a:ext uri="{C572A759-6A51-4108-AA02-DFA0A04FC94B}">
-                <ma14:wrappingTextBoxFlag xmlns:ma14="http://schemas.microsoft.com/office/mac/drawingml/2011/main" xmlns="" val="1"/>
+                <ma14:wrappingTextBoxFlag xmlns="" xmlns:ma14="http://schemas.microsoft.com/office/mac/drawingml/2011/main" val="1"/>
               </a:ext>
             </a:extLst>
           </p:spPr>
@@ -14818,7 +14848,7 @@
             <a:effectLst/>
             <a:extLst>
               <a:ext uri="{C572A759-6A51-4108-AA02-DFA0A04FC94B}">
-                <ma14:wrappingTextBoxFlag xmlns:ma14="http://schemas.microsoft.com/office/mac/drawingml/2011/main" xmlns="" val="1"/>
+                <ma14:wrappingTextBoxFlag xmlns="" xmlns:ma14="http://schemas.microsoft.com/office/mac/drawingml/2011/main" val="1"/>
               </a:ext>
             </a:extLst>
           </p:spPr>
@@ -14986,7 +15016,7 @@
           </a:ln>
           <a:extLst>
             <a:ext uri="{C572A759-6A51-4108-AA02-DFA0A04FC94B}">
-              <ma14:wrappingTextBoxFlag xmlns:ma14="http://schemas.microsoft.com/office/mac/drawingml/2011/main" xmlns="" val="1"/>
+              <ma14:wrappingTextBoxFlag xmlns="" xmlns:ma14="http://schemas.microsoft.com/office/mac/drawingml/2011/main" val="1"/>
             </a:ext>
           </a:extLst>
         </p:spPr>
@@ -15030,7 +15060,7 @@
           </a:ln>
           <a:extLst>
             <a:ext uri="{C572A759-6A51-4108-AA02-DFA0A04FC94B}">
-              <ma14:wrappingTextBoxFlag xmlns:ma14="http://schemas.microsoft.com/office/mac/drawingml/2011/main" xmlns="" val="1"/>
+              <ma14:wrappingTextBoxFlag xmlns="" xmlns:ma14="http://schemas.microsoft.com/office/mac/drawingml/2011/main" val="1"/>
             </a:ext>
           </a:extLst>
         </p:spPr>
@@ -15134,7 +15164,7 @@
             <a:effectLst/>
             <a:extLst>
               <a:ext uri="{C572A759-6A51-4108-AA02-DFA0A04FC94B}">
-                <ma14:wrappingTextBoxFlag xmlns:ma14="http://schemas.microsoft.com/office/mac/drawingml/2011/main" xmlns="" val="1"/>
+                <ma14:wrappingTextBoxFlag xmlns="" xmlns:ma14="http://schemas.microsoft.com/office/mac/drawingml/2011/main" val="1"/>
               </a:ext>
             </a:extLst>
           </p:spPr>
@@ -15316,7 +15346,7 @@
             <a:effectLst/>
             <a:extLst>
               <a:ext uri="{C572A759-6A51-4108-AA02-DFA0A04FC94B}">
-                <ma14:wrappingTextBoxFlag xmlns:ma14="http://schemas.microsoft.com/office/mac/drawingml/2011/main" xmlns="" val="1"/>
+                <ma14:wrappingTextBoxFlag xmlns="" xmlns:ma14="http://schemas.microsoft.com/office/mac/drawingml/2011/main" val="1"/>
               </a:ext>
             </a:extLst>
           </p:spPr>
@@ -15504,7 +15534,7 @@
             <a:effectLst/>
             <a:extLst>
               <a:ext uri="{C572A759-6A51-4108-AA02-DFA0A04FC94B}">
-                <ma14:wrappingTextBoxFlag xmlns:ma14="http://schemas.microsoft.com/office/mac/drawingml/2011/main" xmlns="" val="1"/>
+                <ma14:wrappingTextBoxFlag xmlns="" xmlns:ma14="http://schemas.microsoft.com/office/mac/drawingml/2011/main" val="1"/>
               </a:ext>
             </a:extLst>
           </p:spPr>
@@ -15692,7 +15722,7 @@
             <a:effectLst/>
             <a:extLst>
               <a:ext uri="{C572A759-6A51-4108-AA02-DFA0A04FC94B}">
-                <ma14:wrappingTextBoxFlag xmlns:ma14="http://schemas.microsoft.com/office/mac/drawingml/2011/main" xmlns="" val="1"/>
+                <ma14:wrappingTextBoxFlag xmlns="" xmlns:ma14="http://schemas.microsoft.com/office/mac/drawingml/2011/main" val="1"/>
               </a:ext>
             </a:extLst>
           </p:spPr>
@@ -15880,7 +15910,7 @@
             <a:effectLst/>
             <a:extLst>
               <a:ext uri="{C572A759-6A51-4108-AA02-DFA0A04FC94B}">
-                <ma14:wrappingTextBoxFlag xmlns:ma14="http://schemas.microsoft.com/office/mac/drawingml/2011/main" xmlns="" val="1"/>
+                <ma14:wrappingTextBoxFlag xmlns="" xmlns:ma14="http://schemas.microsoft.com/office/mac/drawingml/2011/main" val="1"/>
               </a:ext>
             </a:extLst>
           </p:spPr>
@@ -16068,7 +16098,7 @@
             <a:effectLst/>
             <a:extLst>
               <a:ext uri="{C572A759-6A51-4108-AA02-DFA0A04FC94B}">
-                <ma14:wrappingTextBoxFlag xmlns:ma14="http://schemas.microsoft.com/office/mac/drawingml/2011/main" xmlns="" val="1"/>
+                <ma14:wrappingTextBoxFlag xmlns="" xmlns:ma14="http://schemas.microsoft.com/office/mac/drawingml/2011/main" val="1"/>
               </a:ext>
             </a:extLst>
           </p:spPr>
@@ -16874,7 +16904,7 @@
           </a:ln>
           <a:extLst>
             <a:ext uri="{C572A759-6A51-4108-AA02-DFA0A04FC94B}">
-              <ma14:wrappingTextBoxFlag xmlns:ma14="http://schemas.microsoft.com/office/mac/drawingml/2011/main" xmlns="" val="1"/>
+              <ma14:wrappingTextBoxFlag xmlns="" xmlns:ma14="http://schemas.microsoft.com/office/mac/drawingml/2011/main" val="1"/>
             </a:ext>
           </a:extLst>
         </p:spPr>
@@ -16917,7 +16947,7 @@
           </a:ln>
           <a:extLst>
             <a:ext uri="{C572A759-6A51-4108-AA02-DFA0A04FC94B}">
-              <ma14:wrappingTextBoxFlag xmlns:ma14="http://schemas.microsoft.com/office/mac/drawingml/2011/main" xmlns="" val="1"/>
+              <ma14:wrappingTextBoxFlag xmlns="" xmlns:ma14="http://schemas.microsoft.com/office/mac/drawingml/2011/main" val="1"/>
             </a:ext>
           </a:extLst>
         </p:spPr>
@@ -17435,7 +17465,7 @@
           </a:ln>
           <a:extLst>
             <a:ext uri="{C572A759-6A51-4108-AA02-DFA0A04FC94B}">
-              <ma14:wrappingTextBoxFlag xmlns:ma14="http://schemas.microsoft.com/office/mac/drawingml/2011/main" xmlns="" val="1"/>
+              <ma14:wrappingTextBoxFlag xmlns="" xmlns:ma14="http://schemas.microsoft.com/office/mac/drawingml/2011/main" val="1"/>
             </a:ext>
           </a:extLst>
         </p:spPr>
@@ -17992,7 +18022,7 @@
           </a:ln>
           <a:extLst>
             <a:ext uri="{C572A759-6A51-4108-AA02-DFA0A04FC94B}">
-              <ma14:wrappingTextBoxFlag xmlns:ma14="http://schemas.microsoft.com/office/mac/drawingml/2011/main" xmlns="" val="1"/>
+              <ma14:wrappingTextBoxFlag xmlns="" xmlns:ma14="http://schemas.microsoft.com/office/mac/drawingml/2011/main" val="1"/>
             </a:ext>
           </a:extLst>
         </p:spPr>

</xml_diff>